<commit_message>
add misa rabu abu
</commit_message>
<xml_diff>
--- a/2021 01 tanggal 23 -24/Bahasa Indonesia edited.pptx
+++ b/2021 01 tanggal 23 -24/Bahasa Indonesia edited.pptx
@@ -82,21 +82,21 @@
   <p:notesSz cx="6858000" cy="9144000"/>
   <p:embeddedFontLst>
     <p:embeddedFont>
+      <p:font typeface="Comfortaa" panose="020B0604020202020204" charset="0"/>
+      <p:regular r:id="rId72"/>
+      <p:bold r:id="rId73"/>
+    </p:embeddedFont>
+    <p:embeddedFont>
+      <p:font typeface="Fredoka One" panose="020B0604020202020204" charset="0"/>
+      <p:regular r:id="rId74"/>
+    </p:embeddedFont>
+    <p:embeddedFont>
       <p:font typeface="Holtwood One SC" panose="020B0604020202020204" charset="0"/>
-      <p:regular r:id="rId72"/>
+      <p:regular r:id="rId75"/>
     </p:embeddedFont>
     <p:embeddedFont>
       <p:font typeface="Berlin Sans FB Demi" panose="020E0802020502020306" pitchFamily="34" charset="0"/>
-      <p:bold r:id="rId73"/>
-    </p:embeddedFont>
-    <p:embeddedFont>
-      <p:font typeface="Comfortaa" panose="020B0604020202020204" charset="0"/>
-      <p:regular r:id="rId74"/>
-      <p:bold r:id="rId75"/>
-    </p:embeddedFont>
-    <p:embeddedFont>
-      <p:font typeface="Fredoka One" panose="020B0604020202020204" charset="0"/>
-      <p:regular r:id="rId76"/>
+      <p:bold r:id="rId76"/>
     </p:embeddedFont>
     <p:embeddedFont>
       <p:font typeface="Arial Black" panose="020B0A04020102020204" pitchFamily="34" charset="0"/>
@@ -15456,7 +15456,7 @@
             <a:fld id="{B61BEF0D-F0BB-DE4B-95CE-6DB70DBA9567}" type="datetimeFigureOut">
               <a:rPr lang="en-US" smtClean="0"/>
               <a:pPr/>
-              <a:t>1/23/2021</a:t>
+              <a:t>1/24/2021</a:t>
             </a:fld>
             <a:endParaRPr lang="en-US" dirty="0"/>
           </a:p>
@@ -16874,17 +16874,6 @@
               </a:rPr>
               <a:t>Misa Hari </a:t>
             </a:r>
-            <a:r>
-              <a:rPr lang="en" sz="5400" dirty="0" smtClean="0">
-                <a:solidFill>
-                  <a:schemeClr val="tx1">
-                    <a:lumMod val="50000"/>
-                  </a:schemeClr>
-                </a:solidFill>
-                <a:latin typeface="Berlin Sans FB Demi" panose="020E0802020502020306" pitchFamily="34" charset="0"/>
-              </a:rPr>
-              <a:t/>
-            </a:r>
             <a:br>
               <a:rPr lang="en" sz="5400" dirty="0" smtClean="0">
                 <a:solidFill>
@@ -16982,40 +16971,7 @@
                 </a:solidFill>
                 <a:latin typeface="Fredoka One" panose="020B0604020202020204" charset="0"/>
               </a:rPr>
-              <a:t>Minggu, </a:t>
-            </a:r>
-            <a:r>
-              <a:rPr lang="en" sz="2400" b="1" dirty="0" smtClean="0">
-                <a:solidFill>
-                  <a:schemeClr val="tx1">
-                    <a:lumMod val="50000"/>
-                  </a:schemeClr>
-                </a:solidFill>
-                <a:latin typeface="Fredoka One" panose="020B0604020202020204" charset="0"/>
-              </a:rPr>
-              <a:t>23</a:t>
-            </a:r>
-            <a:r>
-              <a:rPr lang="en" sz="2400" b="1" dirty="0" smtClean="0">
-                <a:solidFill>
-                  <a:schemeClr val="tx1">
-                    <a:lumMod val="50000"/>
-                  </a:schemeClr>
-                </a:solidFill>
-                <a:latin typeface="Fredoka One" panose="020B0604020202020204" charset="0"/>
-              </a:rPr>
-              <a:t> </a:t>
-            </a:r>
-            <a:r>
-              <a:rPr lang="en" sz="2400" b="1" dirty="0" smtClean="0">
-                <a:solidFill>
-                  <a:schemeClr val="tx1">
-                    <a:lumMod val="50000"/>
-                  </a:schemeClr>
-                </a:solidFill>
-                <a:latin typeface="Fredoka One" panose="020B0604020202020204" charset="0"/>
-              </a:rPr>
-              <a:t>Januari 2021</a:t>
+              <a:t>Minggu, 23 Januari 2021</a:t>
             </a:r>
             <a:endParaRPr sz="2400" b="1" dirty="0">
               <a:solidFill>
@@ -22419,12 +22375,6 @@
               </a:rPr>
               <a:t>.</a:t>
             </a:r>
-            <a:endParaRPr lang="en-US" sz="3600" dirty="0">
-              <a:solidFill>
-                <a:schemeClr val="accent4"/>
-              </a:solidFill>
-              <a:latin typeface="Arial Black" panose="020B0A04020102020204" pitchFamily="34" charset="0"/>
-            </a:endParaRPr>
           </a:p>
         </p:txBody>
       </p:sp>
@@ -22749,11 +22699,6 @@
               </a:rPr>
               <a:t>-Mu</a:t>
             </a:r>
-            <a:endParaRPr lang="en-US" sz="4400" dirty="0">
-              <a:solidFill>
-                <a:schemeClr val="accent4"/>
-              </a:solidFill>
-            </a:endParaRPr>
           </a:p>
         </p:txBody>
       </p:sp>
@@ -26528,7 +26473,7 @@
         </p:nvSpPr>
         <p:spPr>
           <a:xfrm>
-            <a:off x="254643" y="384763"/>
+            <a:off x="254643" y="161480"/>
             <a:ext cx="8356922" cy="502800"/>
           </a:xfrm>
           <a:prstGeom prst="rect">
@@ -26842,7 +26787,7 @@
         </p:nvSpPr>
         <p:spPr>
           <a:xfrm>
-            <a:off x="371467" y="1556946"/>
+            <a:off x="371467" y="1259234"/>
             <a:ext cx="8123274" cy="3052179"/>
           </a:xfrm>
           <a:prstGeom prst="rect">
@@ -27105,37 +27050,68 @@
             </a:lvl9pPr>
           </a:lstStyle>
           <a:p>
-            <a:pPr marL="152400" indent="0" algn="l">
+            <a:pPr marL="152400" indent="0">
               <a:spcAft>
                 <a:spcPts val="1200"/>
               </a:spcAft>
             </a:pPr>
             <a:r>
-              <a:rPr lang="fi-FI" sz="3600" dirty="0" smtClean="0">
+              <a:rPr lang="fi-FI" sz="4800" dirty="0" smtClean="0">
                 <a:solidFill>
                   <a:schemeClr val="accent4"/>
                 </a:solidFill>
                 <a:latin typeface="Arial Black" panose="020B0A04020102020204" pitchFamily="34" charset="0"/>
               </a:rPr>
-              <a:t>Beritahukanlah jalan-jalan Mu </a:t>
-            </a:r>
+              <a:t>Beritahukanlah </a:t>
+            </a:r>
+            <a:endParaRPr lang="fi-FI" sz="4800" dirty="0" smtClean="0">
+              <a:solidFill>
+                <a:schemeClr val="accent4"/>
+              </a:solidFill>
+              <a:latin typeface="Arial Black" panose="020B0A04020102020204" pitchFamily="34" charset="0"/>
+            </a:endParaRPr>
           </a:p>
           <a:p>
-            <a:pPr marL="152400" indent="0" algn="l">
+            <a:pPr marL="152400" indent="0">
               <a:spcAft>
                 <a:spcPts val="1200"/>
               </a:spcAft>
             </a:pPr>
             <a:r>
-              <a:rPr lang="fi-FI" sz="3600" dirty="0" smtClean="0">
+              <a:rPr lang="fi-FI" sz="4800" dirty="0" smtClean="0">
                 <a:solidFill>
                   <a:schemeClr val="accent4"/>
                 </a:solidFill>
                 <a:latin typeface="Arial Black" panose="020B0A04020102020204" pitchFamily="34" charset="0"/>
               </a:rPr>
+              <a:t>jalan-jalan </a:t>
+            </a:r>
+            <a:r>
+              <a:rPr lang="fi-FI" sz="4800" dirty="0" smtClean="0">
+                <a:solidFill>
+                  <a:schemeClr val="accent4"/>
+                </a:solidFill>
+                <a:latin typeface="Arial Black" panose="020B0A04020102020204" pitchFamily="34" charset="0"/>
+              </a:rPr>
+              <a:t>Mu </a:t>
+            </a:r>
+          </a:p>
+          <a:p>
+            <a:pPr marL="152400" indent="0">
+              <a:spcAft>
+                <a:spcPts val="1200"/>
+              </a:spcAft>
+            </a:pPr>
+            <a:r>
+              <a:rPr lang="fi-FI" sz="4800" dirty="0" smtClean="0">
+                <a:solidFill>
+                  <a:schemeClr val="accent4"/>
+                </a:solidFill>
+                <a:latin typeface="Arial Black" panose="020B0A04020102020204" pitchFamily="34" charset="0"/>
+              </a:rPr>
               <a:t>Kepadaku, ya Tuhan</a:t>
             </a:r>
-            <a:endParaRPr lang="fi-FI" sz="3600" dirty="0">
+            <a:endParaRPr lang="fi-FI" sz="4800" dirty="0">
               <a:solidFill>
                 <a:schemeClr val="accent4"/>
               </a:solidFill>
@@ -29073,7 +29049,16 @@
                 </a:solidFill>
                 <a:latin typeface="Arial Black" panose="020B0A04020102020204" pitchFamily="34" charset="0"/>
               </a:rPr>
-              <a:t>Alleluia, alleluia, </a:t>
+              <a:t>Alleluia, </a:t>
+            </a:r>
+            <a:r>
+              <a:rPr lang="sv-SE" sz="5400" dirty="0" smtClean="0">
+                <a:solidFill>
+                  <a:schemeClr val="accent4"/>
+                </a:solidFill>
+                <a:latin typeface="Arial Black" panose="020B0A04020102020204" pitchFamily="34" charset="0"/>
+              </a:rPr>
+              <a:t>Alleluia</a:t>
             </a:r>
             <a:r>
               <a:rPr lang="sv-SE" sz="5400" dirty="0">
@@ -29082,15 +29067,35 @@
                 </a:solidFill>
                 <a:latin typeface="Arial Black" panose="020B0A04020102020204" pitchFamily="34" charset="0"/>
               </a:rPr>
-              <a:t>alleluia, alleluia, alleluia</a:t>
-            </a:r>
-          </a:p>
-          <a:p>
-            <a:pPr marL="152400" indent="0">
-              <a:spcAft>
-                <a:spcPts val="1200"/>
-              </a:spcAft>
-            </a:pPr>
+              <a:t>, </a:t>
+            </a:r>
+            <a:r>
+              <a:rPr lang="sv-SE" sz="5400" dirty="0" smtClean="0">
+                <a:solidFill>
+                  <a:schemeClr val="accent4"/>
+                </a:solidFill>
+                <a:latin typeface="Arial Black" panose="020B0A04020102020204" pitchFamily="34" charset="0"/>
+              </a:rPr>
+              <a:t>Alleluia</a:t>
+            </a:r>
+            <a:r>
+              <a:rPr lang="sv-SE" sz="5400" dirty="0">
+                <a:solidFill>
+                  <a:schemeClr val="accent4"/>
+                </a:solidFill>
+                <a:latin typeface="Arial Black" panose="020B0A04020102020204" pitchFamily="34" charset="0"/>
+              </a:rPr>
+              <a:t>, </a:t>
+            </a:r>
+            <a:r>
+              <a:rPr lang="sv-SE" sz="5400" dirty="0" smtClean="0">
+                <a:solidFill>
+                  <a:schemeClr val="accent4"/>
+                </a:solidFill>
+                <a:latin typeface="Arial Black" panose="020B0A04020102020204" pitchFamily="34" charset="0"/>
+              </a:rPr>
+              <a:t>Alleluia </a:t>
+            </a:r>
             <a:endParaRPr lang="sv-SE" sz="5400" dirty="0">
               <a:solidFill>
                 <a:schemeClr val="accent4"/>
@@ -30162,12 +30167,6 @@
               </a:rPr>
               <a:t>.</a:t>
             </a:r>
-            <a:endParaRPr lang="en-US" sz="3600" dirty="0">
-              <a:solidFill>
-                <a:schemeClr val="accent4"/>
-              </a:solidFill>
-              <a:latin typeface="Arial Black" panose="020B0A04020102020204" pitchFamily="34" charset="0"/>
-            </a:endParaRPr>
           </a:p>
         </p:txBody>
       </p:sp>
@@ -34580,12 +34579,6 @@
               </a:rPr>
               <a:t>, ya Bapa, t’rimalah.</a:t>
             </a:r>
-            <a:endParaRPr lang="sv-SE" sz="3600" dirty="0">
-              <a:solidFill>
-                <a:schemeClr val="accent4"/>
-              </a:solidFill>
-              <a:latin typeface="Arial Black" panose="020B0A04020102020204" pitchFamily="34" charset="0"/>
-            </a:endParaRPr>
           </a:p>
         </p:txBody>
       </p:sp>
@@ -35751,12 +35744,6 @@
               </a:rPr>
               <a:t>T’rimalah, ya Bapa, t’rimalah.</a:t>
             </a:r>
-            <a:endParaRPr lang="sv-SE" sz="3600" dirty="0">
-              <a:solidFill>
-                <a:schemeClr val="accent4"/>
-              </a:solidFill>
-              <a:latin typeface="Arial Black" panose="020B0A04020102020204" pitchFamily="34" charset="0"/>
-            </a:endParaRPr>
           </a:p>
         </p:txBody>
       </p:sp>
@@ -36131,12 +36118,6 @@
               </a:rPr>
               <a:t>t’rimalah, ya Bapa, t’rimalah.</a:t>
             </a:r>
-            <a:endParaRPr lang="sv-SE" sz="3600" dirty="0">
-              <a:solidFill>
-                <a:schemeClr val="accent4"/>
-              </a:solidFill>
-              <a:latin typeface="Arial Black" panose="020B0A04020102020204" pitchFamily="34" charset="0"/>
-            </a:endParaRPr>
           </a:p>
         </p:txBody>
       </p:sp>
@@ -36511,12 +36492,6 @@
               </a:rPr>
               <a:t>t’rimalah, ya Bapa, t’rimalah.</a:t>
             </a:r>
-            <a:endParaRPr lang="sv-SE" sz="3600" dirty="0">
-              <a:solidFill>
-                <a:schemeClr val="accent4"/>
-              </a:solidFill>
-              <a:latin typeface="Arial Black" panose="020B0A04020102020204" pitchFamily="34" charset="0"/>
-            </a:endParaRPr>
           </a:p>
         </p:txBody>
       </p:sp>
@@ -36903,12 +36878,6 @@
               </a:rPr>
               <a:t>, ya Bapa, t’rimalah.</a:t>
             </a:r>
-            <a:endParaRPr lang="sv-SE" sz="3600" dirty="0">
-              <a:solidFill>
-                <a:schemeClr val="accent4"/>
-              </a:solidFill>
-              <a:latin typeface="Arial Black" panose="020B0A04020102020204" pitchFamily="34" charset="0"/>
-            </a:endParaRPr>
           </a:p>
         </p:txBody>
       </p:sp>
@@ -37283,12 +37252,6 @@
               </a:rPr>
               <a:t>T’rimalah, ya Bapa, t’rimalah.</a:t>
             </a:r>
-            <a:endParaRPr lang="sv-SE" sz="3600" dirty="0">
-              <a:solidFill>
-                <a:schemeClr val="accent4"/>
-              </a:solidFill>
-              <a:latin typeface="Arial Black" panose="020B0A04020102020204" pitchFamily="34" charset="0"/>
-            </a:endParaRPr>
           </a:p>
         </p:txBody>
       </p:sp>
@@ -37663,12 +37626,6 @@
               </a:rPr>
               <a:t>t’rimalah, ya Bapa, t’rimalah.</a:t>
             </a:r>
-            <a:endParaRPr lang="sv-SE" sz="3600" dirty="0">
-              <a:solidFill>
-                <a:schemeClr val="accent4"/>
-              </a:solidFill>
-              <a:latin typeface="Arial Black" panose="020B0A04020102020204" pitchFamily="34" charset="0"/>
-            </a:endParaRPr>
           </a:p>
         </p:txBody>
       </p:sp>
@@ -38043,12 +38000,6 @@
               </a:rPr>
               <a:t>t’rimalah, ya Bapa, t’rimalah.</a:t>
             </a:r>
-            <a:endParaRPr lang="sv-SE" sz="3600" dirty="0">
-              <a:solidFill>
-                <a:schemeClr val="accent4"/>
-              </a:solidFill>
-              <a:latin typeface="Arial Black" panose="020B0A04020102020204" pitchFamily="34" charset="0"/>
-            </a:endParaRPr>
           </a:p>
         </p:txBody>
       </p:sp>
@@ -41703,12 +41654,6 @@
               </a:rPr>
               <a:t>dan Darah nan suci</a:t>
             </a:r>
-            <a:endParaRPr lang="sv-SE" sz="3600" dirty="0">
-              <a:solidFill>
-                <a:schemeClr val="accent4"/>
-              </a:solidFill>
-              <a:latin typeface="Arial Black" panose="020B0A04020102020204" pitchFamily="34" charset="0"/>
-            </a:endParaRPr>
           </a:p>
         </p:txBody>
       </p:sp>
@@ -42114,12 +42059,6 @@
               </a:rPr>
               <a:t>dan Darah nan suci</a:t>
             </a:r>
-            <a:endParaRPr lang="sv-SE" sz="3600" dirty="0">
-              <a:solidFill>
-                <a:schemeClr val="accent4"/>
-              </a:solidFill>
-              <a:latin typeface="Arial Black" panose="020B0A04020102020204" pitchFamily="34" charset="0"/>
-            </a:endParaRPr>
           </a:p>
         </p:txBody>
       </p:sp>
@@ -42525,12 +42464,6 @@
               </a:rPr>
               <a:t>kami menyambutMu</a:t>
             </a:r>
-            <a:endParaRPr lang="sv-SE" sz="3600" dirty="0">
-              <a:solidFill>
-                <a:schemeClr val="accent4"/>
-              </a:solidFill>
-              <a:latin typeface="Arial Black" panose="020B0A04020102020204" pitchFamily="34" charset="0"/>
-            </a:endParaRPr>
           </a:p>
         </p:txBody>
       </p:sp>
@@ -42936,12 +42869,6 @@
               </a:rPr>
               <a:t>kami.</a:t>
             </a:r>
-            <a:endParaRPr lang="sv-SE" sz="3600" dirty="0">
-              <a:solidFill>
-                <a:schemeClr val="accent4"/>
-              </a:solidFill>
-              <a:latin typeface="Arial Black" panose="020B0A04020102020204" pitchFamily="34" charset="0"/>
-            </a:endParaRPr>
           </a:p>
         </p:txBody>
       </p:sp>
@@ -43320,11 +43247,6 @@
               </a:rPr>
               <a:t>-Mu</a:t>
             </a:r>
-            <a:endParaRPr lang="en-US" sz="4400" dirty="0">
-              <a:solidFill>
-                <a:schemeClr val="accent4"/>
-              </a:solidFill>
-            </a:endParaRPr>
           </a:p>
         </p:txBody>
       </p:sp>
@@ -43678,12 +43600,6 @@
               </a:rPr>
               <a:t>Sungguh Engkau sahabatKu,</a:t>
             </a:r>
-            <a:endParaRPr lang="pt-BR" sz="3600" dirty="0">
-              <a:solidFill>
-                <a:schemeClr val="accent4"/>
-              </a:solidFill>
-              <a:latin typeface="Arial Black" panose="020B0A04020102020204" pitchFamily="34" charset="0"/>
-            </a:endParaRPr>
           </a:p>
         </p:txBody>
       </p:sp>
@@ -44132,12 +44048,6 @@
               </a:rPr>
               <a:t>sertamu.</a:t>
             </a:r>
-            <a:endParaRPr lang="pt-BR" sz="3600" dirty="0">
-              <a:solidFill>
-                <a:schemeClr val="accent4"/>
-              </a:solidFill>
-              <a:latin typeface="Arial Black" panose="020B0A04020102020204" pitchFamily="34" charset="0"/>
-            </a:endParaRPr>
           </a:p>
         </p:txBody>
       </p:sp>
@@ -44528,12 +44438,6 @@
               </a:rPr>
               <a:t>Kini Aku serahkan tugas, </a:t>
             </a:r>
-            <a:endParaRPr lang="pt-BR" sz="3600" dirty="0">
-              <a:solidFill>
-                <a:schemeClr val="accent4"/>
-              </a:solidFill>
-              <a:latin typeface="Arial Black" panose="020B0A04020102020204" pitchFamily="34" charset="0"/>
-            </a:endParaRPr>
           </a:p>
         </p:txBody>
       </p:sp>
@@ -44986,12 +44890,6 @@
               </a:rPr>
               <a:t>sertamu.</a:t>
             </a:r>
-            <a:endParaRPr lang="pt-BR" sz="3600" dirty="0">
-              <a:solidFill>
-                <a:schemeClr val="accent4"/>
-              </a:solidFill>
-              <a:latin typeface="Arial Black" panose="020B0A04020102020204" pitchFamily="34" charset="0"/>
-            </a:endParaRPr>
           </a:p>
         </p:txBody>
       </p:sp>

</xml_diff>